<commit_message>
oop/basic class diagrams: tweak text
</commit_message>
<xml_diff>
--- a/diagrams/oopImplementation/associations/logicMinefield.pptx
+++ b/diagrams/oopImplementation/associations/logicMinefield.pptx
@@ -104,6 +104,22 @@
       </a:defRPr>
     </a:lvl9pPr>
   </p:defaultTextStyle>
+  <p:extLst>
+    <p:ext uri="{EFAFB233-063F-42B5-8137-9DF3F51BA10A}">
+      <p15:sldGuideLst xmlns:p15="http://schemas.microsoft.com/office/powerpoint/2012/main">
+        <p15:guide id="1" orient="horz" pos="2160">
+          <p15:clr>
+            <a:srgbClr val="A4A3A4"/>
+          </p15:clr>
+        </p15:guide>
+        <p15:guide id="2" pos="2880">
+          <p15:clr>
+            <a:srgbClr val="A4A3A4"/>
+          </p15:clr>
+        </p15:guide>
+      </p15:sldGuideLst>
+    </p:ext>
+  </p:extLst>
 </p:presentation>
 </file>
 
@@ -288,7 +304,7 @@
           <a:p>
             <a:fld id="{7B671FCF-AF23-48C3-A770-3432D6718C0C}" type="datetimeFigureOut">
               <a:rPr lang="en-SG" smtClean="0"/>
-              <a:t>10/7/2017</a:t>
+              <a:t>30/8/2017</a:t>
             </a:fld>
             <a:endParaRPr lang="en-SG"/>
           </a:p>
@@ -458,7 +474,7 @@
           <a:p>
             <a:fld id="{7B671FCF-AF23-48C3-A770-3432D6718C0C}" type="datetimeFigureOut">
               <a:rPr lang="en-SG" smtClean="0"/>
-              <a:t>10/7/2017</a:t>
+              <a:t>30/8/2017</a:t>
             </a:fld>
             <a:endParaRPr lang="en-SG"/>
           </a:p>
@@ -638,7 +654,7 @@
           <a:p>
             <a:fld id="{7B671FCF-AF23-48C3-A770-3432D6718C0C}" type="datetimeFigureOut">
               <a:rPr lang="en-SG" smtClean="0"/>
-              <a:t>10/7/2017</a:t>
+              <a:t>30/8/2017</a:t>
             </a:fld>
             <a:endParaRPr lang="en-SG"/>
           </a:p>
@@ -808,7 +824,7 @@
           <a:p>
             <a:fld id="{7B671FCF-AF23-48C3-A770-3432D6718C0C}" type="datetimeFigureOut">
               <a:rPr lang="en-SG" smtClean="0"/>
-              <a:t>10/7/2017</a:t>
+              <a:t>30/8/2017</a:t>
             </a:fld>
             <a:endParaRPr lang="en-SG"/>
           </a:p>
@@ -1054,7 +1070,7 @@
           <a:p>
             <a:fld id="{7B671FCF-AF23-48C3-A770-3432D6718C0C}" type="datetimeFigureOut">
               <a:rPr lang="en-SG" smtClean="0"/>
-              <a:t>10/7/2017</a:t>
+              <a:t>30/8/2017</a:t>
             </a:fld>
             <a:endParaRPr lang="en-SG"/>
           </a:p>
@@ -1342,7 +1358,7 @@
           <a:p>
             <a:fld id="{7B671FCF-AF23-48C3-A770-3432D6718C0C}" type="datetimeFigureOut">
               <a:rPr lang="en-SG" smtClean="0"/>
-              <a:t>10/7/2017</a:t>
+              <a:t>30/8/2017</a:t>
             </a:fld>
             <a:endParaRPr lang="en-SG"/>
           </a:p>
@@ -1764,7 +1780,7 @@
           <a:p>
             <a:fld id="{7B671FCF-AF23-48C3-A770-3432D6718C0C}" type="datetimeFigureOut">
               <a:rPr lang="en-SG" smtClean="0"/>
-              <a:t>10/7/2017</a:t>
+              <a:t>30/8/2017</a:t>
             </a:fld>
             <a:endParaRPr lang="en-SG"/>
           </a:p>
@@ -1882,7 +1898,7 @@
           <a:p>
             <a:fld id="{7B671FCF-AF23-48C3-A770-3432D6718C0C}" type="datetimeFigureOut">
               <a:rPr lang="en-SG" smtClean="0"/>
-              <a:t>10/7/2017</a:t>
+              <a:t>30/8/2017</a:t>
             </a:fld>
             <a:endParaRPr lang="en-SG"/>
           </a:p>
@@ -1977,7 +1993,7 @@
           <a:p>
             <a:fld id="{7B671FCF-AF23-48C3-A770-3432D6718C0C}" type="datetimeFigureOut">
               <a:rPr lang="en-SG" smtClean="0"/>
-              <a:t>10/7/2017</a:t>
+              <a:t>30/8/2017</a:t>
             </a:fld>
             <a:endParaRPr lang="en-SG"/>
           </a:p>
@@ -2254,7 +2270,7 @@
           <a:p>
             <a:fld id="{7B671FCF-AF23-48C3-A770-3432D6718C0C}" type="datetimeFigureOut">
               <a:rPr lang="en-SG" smtClean="0"/>
-              <a:t>10/7/2017</a:t>
+              <a:t>30/8/2017</a:t>
             </a:fld>
             <a:endParaRPr lang="en-SG"/>
           </a:p>
@@ -2507,7 +2523,7 @@
           <a:p>
             <a:fld id="{7B671FCF-AF23-48C3-A770-3432D6718C0C}" type="datetimeFigureOut">
               <a:rPr lang="en-SG" smtClean="0"/>
-              <a:t>10/7/2017</a:t>
+              <a:t>30/8/2017</a:t>
             </a:fld>
             <a:endParaRPr lang="en-SG"/>
           </a:p>
@@ -2720,7 +2736,7 @@
           <a:p>
             <a:fld id="{7B671FCF-AF23-48C3-A770-3432D6718C0C}" type="datetimeFigureOut">
               <a:rPr lang="en-SG" smtClean="0"/>
-              <a:t>10/7/2017</a:t>
+              <a:t>30/8/2017</a:t>
             </a:fld>
             <a:endParaRPr lang="en-SG"/>
           </a:p>
@@ -3188,14 +3204,14 @@
             <a:r>
               <a:rPr lang="en-US" sz="2000" dirty="0" smtClean="0">
                 <a:solidFill>
-                  <a:srgbClr val="C00000"/>
+                  <a:sysClr val="windowText" lastClr="000000"/>
                 </a:solidFill>
               </a:rPr>
               <a:t>Minefield</a:t>
             </a:r>
             <a:endParaRPr lang="en-US" sz="2000" dirty="0">
               <a:solidFill>
-                <a:srgbClr val="C00000"/>
+                <a:sysClr val="windowText" lastClr="000000"/>
               </a:solidFill>
             </a:endParaRPr>
           </a:p>
@@ -3240,6 +3256,44 @@
           </a:fontRef>
         </p:style>
       </p:cxnSp>
+      <p:sp>
+        <p:nvSpPr>
+          <p:cNvPr id="2" name="TextBox 1"/>
+          <p:cNvSpPr txBox="1"/>
+          <p:nvPr/>
+        </p:nvSpPr>
+        <p:spPr>
+          <a:xfrm>
+            <a:off x="2411760" y="2132856"/>
+            <a:ext cx="576064" cy="369332"/>
+          </a:xfrm>
+          <a:prstGeom prst="rect">
+            <a:avLst/>
+          </a:prstGeom>
+          <a:noFill/>
+        </p:spPr>
+        <p:txBody>
+          <a:bodyPr wrap="square" rtlCol="0">
+            <a:spAutoFit/>
+          </a:bodyPr>
+          <a:lstStyle/>
+          <a:p>
+            <a:r>
+              <a:rPr lang="en-US" dirty="0" smtClean="0">
+                <a:solidFill>
+                  <a:srgbClr val="C00000"/>
+                </a:solidFill>
+              </a:rPr>
+              <a:t>0..1</a:t>
+            </a:r>
+            <a:endParaRPr lang="en-US" dirty="0">
+              <a:solidFill>
+                <a:srgbClr val="C00000"/>
+              </a:solidFill>
+            </a:endParaRPr>
+          </a:p>
+        </p:txBody>
+      </p:sp>
     </p:spTree>
     <p:extLst>
       <p:ext uri="{BB962C8B-B14F-4D97-AF65-F5344CB8AC3E}">

</xml_diff>